<commit_message>
updated logic app slides
</commit_message>
<xml_diff>
--- a/5-Logic_App_Overview/Serverless_Workshop-Logic_Apps_Overview.pptx
+++ b/5-Logic_App_Overview/Serverless_Workshop-Logic_Apps_Overview.pptx
@@ -16,7 +16,7 @@
     <p:sldId id="260" r:id="rId7"/>
     <p:sldId id="261" r:id="rId8"/>
     <p:sldId id="262" r:id="rId9"/>
-    <p:sldId id="263" r:id="rId10"/>
+    <p:sldId id="278" r:id="rId10"/>
     <p:sldId id="264" r:id="rId11"/>
     <p:sldId id="265" r:id="rId12"/>
     <p:sldId id="266" r:id="rId13"/>
@@ -28,7 +28,7 @@
     <p:sldId id="272" r:id="rId19"/>
     <p:sldId id="273" r:id="rId20"/>
     <p:sldId id="274" r:id="rId21"/>
-    <p:sldId id="275" r:id="rId22"/>
+    <p:sldId id="279" r:id="rId22"/>
     <p:sldId id="276" r:id="rId23"/>
     <p:sldId id="277" r:id="rId24"/>
   </p:sldIdLst>
@@ -141,7 +141,7 @@
             <p14:sldId id="260"/>
             <p14:sldId id="261"/>
             <p14:sldId id="262"/>
-            <p14:sldId id="263"/>
+            <p14:sldId id="278"/>
             <p14:sldId id="264"/>
             <p14:sldId id="265"/>
             <p14:sldId id="266"/>
@@ -153,7 +153,7 @@
             <p14:sldId id="272"/>
             <p14:sldId id="273"/>
             <p14:sldId id="274"/>
-            <p14:sldId id="275"/>
+            <p14:sldId id="279"/>
             <p14:sldId id="276"/>
             <p14:sldId id="277"/>
           </p14:sldIdLst>
@@ -3019,7 +3019,7 @@
           <a:p>
             <a:fld id="{FD40F9F5-AEEA-4D4C-B19D-E89DDEC55240}" type="datetimeFigureOut">
               <a:rPr lang="en-US" smtClean="0"/>
-              <a:t>2/8/2018</a:t>
+              <a:t>2/9/2018</a:t>
             </a:fld>
             <a:endParaRPr lang="en-US"/>
           </a:p>
@@ -3593,7 +3593,7 @@
                 <a:tabLst/>
                 <a:defRPr/>
               </a:pPr>
-              <a:t>2/8/2018 4:26 PM</a:t>
+              <a:t>2/9/2018 2:34 PM</a:t>
             </a:fld>
             <a:endParaRPr kumimoji="0" lang="en-US" sz="1800" b="0" i="0" u="none" strike="noStrike" kern="0" cap="none" spc="0" normalizeH="0" baseline="0" noProof="0">
               <a:ln>
@@ -3987,7 +3987,7 @@
                 <a:tabLst/>
                 <a:defRPr/>
               </a:pPr>
-              <a:t>2/8/2018 4:26 PM</a:t>
+              <a:t>2/9/2018 2:34 PM</a:t>
             </a:fld>
             <a:endParaRPr kumimoji="0" lang="en-US" sz="1800" b="0" i="0" u="none" strike="noStrike" kern="0" cap="none" spc="0" normalizeH="0" baseline="0" noProof="0">
               <a:ln>
@@ -4323,7 +4323,7 @@
                 <a:tabLst/>
                 <a:defRPr/>
               </a:pPr>
-              <a:t>2/8/2018 4:26 PM</a:t>
+              <a:t>2/9/2018 2:34 PM</a:t>
             </a:fld>
             <a:endParaRPr kumimoji="0" lang="en-US" sz="1200" b="0" i="0" u="none" strike="noStrike" kern="1200" cap="none" spc="0" normalizeH="0" baseline="0" noProof="0">
               <a:ln>
@@ -4769,7 +4769,7 @@
                 <a:tabLst/>
                 <a:defRPr/>
               </a:pPr>
-              <a:t>2/8/2018 4:26 PM</a:t>
+              <a:t>2/9/2018 2:34 PM</a:t>
             </a:fld>
             <a:endParaRPr kumimoji="0" lang="en-US" sz="1800" b="0" i="0" u="none" strike="noStrike" kern="0" cap="none" spc="0" normalizeH="0" baseline="0" noProof="0">
               <a:ln>
@@ -5146,7 +5146,7 @@
                 <a:tabLst/>
                 <a:defRPr/>
               </a:pPr>
-              <a:t>2/8/2018 4:26 PM</a:t>
+              <a:t>2/9/2018 2:34 PM</a:t>
             </a:fld>
             <a:endParaRPr kumimoji="0" lang="en-US" sz="1200" b="0" i="0" u="none" strike="noStrike" kern="1200" cap="none" spc="0" normalizeH="0" baseline="0" noProof="0">
               <a:ln>
@@ -5482,7 +5482,7 @@
                 <a:tabLst/>
                 <a:defRPr/>
               </a:pPr>
-              <a:t>2/8/2018 4:26 PM</a:t>
+              <a:t>2/9/2018 2:34 PM</a:t>
             </a:fld>
             <a:endParaRPr kumimoji="0" lang="en-US" sz="1200" b="0" i="0" u="none" strike="noStrike" kern="1200" cap="none" spc="0" normalizeH="0" baseline="0" noProof="0">
               <a:ln>
@@ -5799,7 +5799,7 @@
                 <a:tabLst/>
                 <a:defRPr/>
               </a:pPr>
-              <a:t>2/8/2018 4:26 PM</a:t>
+              <a:t>2/9/2018 2:34 PM</a:t>
             </a:fld>
             <a:endParaRPr kumimoji="0" lang="en-US" sz="1200" b="0" i="0" u="none" strike="noStrike" kern="1200" cap="none" spc="0" normalizeH="0" baseline="0" noProof="0">
               <a:ln>
@@ -6135,7 +6135,7 @@
                 <a:tabLst/>
                 <a:defRPr/>
               </a:pPr>
-              <a:t>2/8/2018 4:26 PM</a:t>
+              <a:t>2/9/2018 2:34 PM</a:t>
             </a:fld>
             <a:endParaRPr kumimoji="0" lang="en-US" sz="1200" b="0" i="0" u="none" strike="noStrike" kern="1200" cap="none" spc="0" normalizeH="0" baseline="0" noProof="0">
               <a:ln>
@@ -6471,7 +6471,7 @@
                 <a:tabLst/>
                 <a:defRPr/>
               </a:pPr>
-              <a:t>2/8/2018 4:26 PM</a:t>
+              <a:t>2/9/2018 2:34 PM</a:t>
             </a:fld>
             <a:endParaRPr kumimoji="0" lang="en-US" sz="1200" b="0" i="0" u="none" strike="noStrike" kern="1200" cap="none" spc="0" normalizeH="0" baseline="0" noProof="0">
               <a:ln>
@@ -6807,7 +6807,7 @@
                 <a:tabLst/>
                 <a:defRPr/>
               </a:pPr>
-              <a:t>2/8/2018 4:26 PM</a:t>
+              <a:t>2/9/2018 2:34 PM</a:t>
             </a:fld>
             <a:endParaRPr kumimoji="0" lang="en-US" sz="1200" b="0" i="0" u="none" strike="noStrike" kern="1200" cap="none" spc="0" normalizeH="0" baseline="0" noProof="0">
               <a:ln>
@@ -7344,7 +7344,7 @@
     </p:spTree>
     <p:extLst>
       <p:ext uri="{BB962C8B-B14F-4D97-AF65-F5344CB8AC3E}">
-        <p14:creationId xmlns:p14="http://schemas.microsoft.com/office/powerpoint/2010/main" val="32999324"/>
+        <p14:creationId xmlns:p14="http://schemas.microsoft.com/office/powerpoint/2010/main" val="3351280317"/>
       </p:ext>
     </p:extLst>
   </p:cSld>
@@ -7863,7 +7863,7 @@
                 <a:tabLst/>
                 <a:defRPr/>
               </a:pPr>
-              <a:t>2/8/2018 4:26 PM</a:t>
+              <a:t>2/9/2018 2:34 PM</a:t>
             </a:fld>
             <a:endParaRPr kumimoji="0" lang="en-US" sz="1200" b="0" i="0" u="none" strike="noStrike" kern="1200" cap="none" spc="0" normalizeH="0" baseline="0" noProof="0">
               <a:ln>
@@ -8202,7 +8202,7 @@
                 <a:tabLst/>
                 <a:defRPr/>
               </a:pPr>
-              <a:t>2/8/2018 4:26 PM</a:t>
+              <a:t>2/9/2018 2:34 PM</a:t>
             </a:fld>
             <a:endParaRPr kumimoji="0" lang="en-US" sz="1800" b="0" i="0" u="none" strike="noStrike" kern="0" cap="none" spc="0" normalizeH="0" baseline="0" noProof="0">
               <a:ln>
@@ -8541,7 +8541,7 @@
                 <a:tabLst/>
                 <a:defRPr/>
               </a:pPr>
-              <a:t>2/8/2018 4:26 PM</a:t>
+              <a:t>2/9/2018 2:34 PM</a:t>
             </a:fld>
             <a:endParaRPr kumimoji="0" lang="en-US" sz="1800" b="0" i="0" u="none" strike="noStrike" kern="0" cap="none" spc="0" normalizeH="0" baseline="0" noProof="0">
               <a:ln>
@@ -8880,7 +8880,7 @@
                 <a:tabLst/>
                 <a:defRPr/>
               </a:pPr>
-              <a:t>2/8/2018 4:26 PM</a:t>
+              <a:t>2/9/2018 2:34 PM</a:t>
             </a:fld>
             <a:endParaRPr kumimoji="0" lang="en-US" sz="1800" b="0" i="0" u="none" strike="noStrike" kern="0" cap="none" spc="0" normalizeH="0" baseline="0" noProof="0">
               <a:ln>
@@ -9219,7 +9219,7 @@
                 <a:tabLst/>
                 <a:defRPr/>
               </a:pPr>
-              <a:t>2/8/2018 4:26 PM</a:t>
+              <a:t>2/9/2018 2:34 PM</a:t>
             </a:fld>
             <a:endParaRPr kumimoji="0" lang="en-US" sz="1800" b="0" i="0" u="none" strike="noStrike" kern="0" cap="none" spc="0" normalizeH="0" baseline="0" noProof="0">
               <a:ln>
@@ -9471,7 +9471,7 @@
     </p:spTree>
     <p:extLst>
       <p:ext uri="{BB962C8B-B14F-4D97-AF65-F5344CB8AC3E}">
-        <p14:creationId xmlns:p14="http://schemas.microsoft.com/office/powerpoint/2010/main" val="562016267"/>
+        <p14:creationId xmlns:p14="http://schemas.microsoft.com/office/powerpoint/2010/main" val="1417284270"/>
       </p:ext>
     </p:extLst>
   </p:cSld>
@@ -9705,7 +9705,7 @@
                 <a:tabLst/>
                 <a:defRPr/>
               </a:pPr>
-              <a:t>2/8/2018 4:26 PM</a:t>
+              <a:t>2/9/2018 2:34 PM</a:t>
             </a:fld>
             <a:endParaRPr kumimoji="0" lang="en-US" sz="1800" b="0" i="0" u="none" strike="noStrike" kern="0" cap="none" spc="0" normalizeH="0" baseline="0" noProof="0">
               <a:ln>
@@ -9967,7 +9967,7 @@
           <a:p>
             <a:fld id="{28BB1C66-085B-436B-BA13-97E320E7DC4F}" type="datetimeFigureOut">
               <a:rPr lang="en-US" smtClean="0"/>
-              <a:t>2/8/2018</a:t>
+              <a:t>2/9/2018</a:t>
             </a:fld>
             <a:endParaRPr lang="en-US"/>
           </a:p>
@@ -10165,7 +10165,7 @@
           <a:p>
             <a:fld id="{28BB1C66-085B-436B-BA13-97E320E7DC4F}" type="datetimeFigureOut">
               <a:rPr lang="en-US" smtClean="0"/>
-              <a:t>2/8/2018</a:t>
+              <a:t>2/9/2018</a:t>
             </a:fld>
             <a:endParaRPr lang="en-US"/>
           </a:p>
@@ -10373,7 +10373,7 @@
           <a:p>
             <a:fld id="{28BB1C66-085B-436B-BA13-97E320E7DC4F}" type="datetimeFigureOut">
               <a:rPr lang="en-US" smtClean="0"/>
-              <a:t>2/8/2018</a:t>
+              <a:t>2/9/2018</a:t>
             </a:fld>
             <a:endParaRPr lang="en-US"/>
           </a:p>
@@ -11971,7 +11971,7 @@
           <a:p>
             <a:fld id="{28BB1C66-085B-436B-BA13-97E320E7DC4F}" type="datetimeFigureOut">
               <a:rPr lang="en-US" smtClean="0"/>
-              <a:t>2/8/2018</a:t>
+              <a:t>2/9/2018</a:t>
             </a:fld>
             <a:endParaRPr lang="en-US"/>
           </a:p>
@@ -13662,7 +13662,7 @@
           <a:p>
             <a:fld id="{28BB1C66-085B-436B-BA13-97E320E7DC4F}" type="datetimeFigureOut">
               <a:rPr lang="en-US" smtClean="0"/>
-              <a:t>2/8/2018</a:t>
+              <a:t>2/9/2018</a:t>
             </a:fld>
             <a:endParaRPr lang="en-US"/>
           </a:p>
@@ -14613,7 +14613,7 @@
           <a:p>
             <a:fld id="{72D4B4F5-9F56-4AF2-B8FC-381E478EDD58}" type="datetimeFigureOut">
               <a:rPr lang="en-US" smtClean="0"/>
-              <a:t>2/8/2018</a:t>
+              <a:t>2/9/2018</a:t>
             </a:fld>
             <a:endParaRPr lang="en-US"/>
           </a:p>
@@ -15235,6 +15235,97 @@
 </p:sldLayout>
 </file>
 
+<file path=ppt/slideLayouts/slideLayout39.xml><?xml version="1.0" encoding="utf-8"?>
+<p:sldLayout xmlns:a="http://schemas.openxmlformats.org/drawingml/2006/main" xmlns:r="http://schemas.openxmlformats.org/officeDocument/2006/relationships" xmlns:p="http://schemas.openxmlformats.org/presentationml/2006/main" userDrawn="1">
+  <p:cSld name="1_Demo slide">
+    <p:bg>
+      <p:bgPr>
+        <a:solidFill>
+          <a:schemeClr val="accent3"/>
+        </a:solidFill>
+        <a:effectLst/>
+      </p:bgPr>
+    </p:bg>
+    <p:spTree>
+      <p:nvGrpSpPr>
+        <p:cNvPr id="1" name=""/>
+        <p:cNvGrpSpPr/>
+        <p:nvPr/>
+      </p:nvGrpSpPr>
+      <p:grpSpPr>
+        <a:xfrm>
+          <a:off x="0" y="0"/>
+          <a:ext cx="0" cy="0"/>
+          <a:chOff x="0" y="0"/>
+          <a:chExt cx="0" cy="0"/>
+        </a:xfrm>
+      </p:grpSpPr>
+      <p:sp>
+        <p:nvSpPr>
+          <p:cNvPr id="4" name="Title 1">
+            <a:extLst>
+              <a:ext uri="{FF2B5EF4-FFF2-40B4-BE49-F238E27FC236}">
+                <a16:creationId xmlns:a16="http://schemas.microsoft.com/office/drawing/2014/main" id="{01C49B49-6C22-4973-BCE9-2EF2F5323C34}"/>
+              </a:ext>
+            </a:extLst>
+          </p:cNvPr>
+          <p:cNvSpPr>
+            <a:spLocks noGrp="1"/>
+          </p:cNvSpPr>
+          <p:nvPr>
+            <p:ph type="title"/>
+          </p:nvPr>
+        </p:nvSpPr>
+        <p:spPr>
+          <a:xfrm>
+            <a:off x="269240" y="289511"/>
+            <a:ext cx="11655840" cy="899665"/>
+          </a:xfrm>
+        </p:spPr>
+        <p:txBody>
+          <a:bodyPr/>
+          <a:lstStyle>
+            <a:lvl1pPr>
+              <a:defRPr sz="7060">
+                <a:solidFill>
+                  <a:schemeClr val="accent2"/>
+                </a:solidFill>
+              </a:defRPr>
+            </a:lvl1pPr>
+          </a:lstStyle>
+          <a:p>
+            <a:r>
+              <a:rPr lang="en-US" dirty="0"/>
+              <a:t>Click to edit Master title style</a:t>
+            </a:r>
+          </a:p>
+        </p:txBody>
+      </p:sp>
+    </p:spTree>
+    <p:extLst>
+      <p:ext uri="{BB962C8B-B14F-4D97-AF65-F5344CB8AC3E}">
+        <p14:creationId xmlns:p14="http://schemas.microsoft.com/office/powerpoint/2010/main" val="377112269"/>
+      </p:ext>
+    </p:extLst>
+  </p:cSld>
+  <p:clrMapOvr>
+    <a:overrideClrMapping bg1="lt1" tx1="dk1" bg2="lt2" tx2="dk2" accent1="accent1" accent2="accent2" accent3="accent3" accent4="accent4" accent5="accent5" accent6="accent6" hlink="hlink" folHlink="folHlink"/>
+  </p:clrMapOvr>
+  <mc:AlternateContent xmlns:mc="http://schemas.openxmlformats.org/markup-compatibility/2006" xmlns:p14="http://schemas.microsoft.com/office/powerpoint/2010/main">
+    <mc:Choice Requires="p14">
+      <p:transition spd="slow" p14:dur="3400">
+        <p14:reveal/>
+      </p:transition>
+    </mc:Choice>
+    <mc:Fallback xmlns="">
+      <p:transition spd="slow">
+        <p:fade/>
+      </p:transition>
+    </mc:Fallback>
+  </mc:AlternateContent>
+</p:sldLayout>
+</file>
+
 <file path=ppt/slideLayouts/slideLayout4.xml><?xml version="1.0" encoding="utf-8"?>
 <p:sldLayout xmlns:a="http://schemas.openxmlformats.org/drawingml/2006/main" xmlns:r="http://schemas.openxmlformats.org/officeDocument/2006/relationships" xmlns:p="http://schemas.openxmlformats.org/presentationml/2006/main" type="twoObj" preserve="1">
   <p:cSld name="Two Content">
@@ -15427,7 +15518,7 @@
           <a:p>
             <a:fld id="{28BB1C66-085B-436B-BA13-97E320E7DC4F}" type="datetimeFigureOut">
               <a:rPr lang="en-US" smtClean="0"/>
-              <a:t>2/8/2018</a:t>
+              <a:t>2/9/2018</a:t>
             </a:fld>
             <a:endParaRPr lang="en-US"/>
           </a:p>
@@ -15839,7 +15930,7 @@
           <a:p>
             <a:fld id="{28BB1C66-085B-436B-BA13-97E320E7DC4F}" type="datetimeFigureOut">
               <a:rPr lang="en-US" smtClean="0"/>
-              <a:t>2/8/2018</a:t>
+              <a:t>2/9/2018</a:t>
             </a:fld>
             <a:endParaRPr lang="en-US"/>
           </a:p>
@@ -15980,7 +16071,7 @@
           <a:p>
             <a:fld id="{28BB1C66-085B-436B-BA13-97E320E7DC4F}" type="datetimeFigureOut">
               <a:rPr lang="en-US" smtClean="0"/>
-              <a:t>2/8/2018</a:t>
+              <a:t>2/9/2018</a:t>
             </a:fld>
             <a:endParaRPr lang="en-US"/>
           </a:p>
@@ -16093,7 +16184,7 @@
           <a:p>
             <a:fld id="{28BB1C66-085B-436B-BA13-97E320E7DC4F}" type="datetimeFigureOut">
               <a:rPr lang="en-US" smtClean="0"/>
-              <a:t>2/8/2018</a:t>
+              <a:t>2/9/2018</a:t>
             </a:fld>
             <a:endParaRPr lang="en-US"/>
           </a:p>
@@ -16404,7 +16495,7 @@
           <a:p>
             <a:fld id="{28BB1C66-085B-436B-BA13-97E320E7DC4F}" type="datetimeFigureOut">
               <a:rPr lang="en-US" smtClean="0"/>
-              <a:t>2/8/2018</a:t>
+              <a:t>2/9/2018</a:t>
             </a:fld>
             <a:endParaRPr lang="en-US"/>
           </a:p>
@@ -16692,7 +16783,7 @@
           <a:p>
             <a:fld id="{28BB1C66-085B-436B-BA13-97E320E7DC4F}" type="datetimeFigureOut">
               <a:rPr lang="en-US" smtClean="0"/>
-              <a:t>2/8/2018</a:t>
+              <a:t>2/9/2018</a:t>
             </a:fld>
             <a:endParaRPr lang="en-US"/>
           </a:p>
@@ -16933,7 +17024,7 @@
           <a:p>
             <a:fld id="{28BB1C66-085B-436B-BA13-97E320E7DC4F}" type="datetimeFigureOut">
               <a:rPr lang="en-US" smtClean="0"/>
-              <a:t>2/8/2018</a:t>
+              <a:t>2/9/2018</a:t>
             </a:fld>
             <a:endParaRPr lang="en-US"/>
           </a:p>
@@ -18890,6 +18981,7 @@
     <p:sldLayoutId id="2147483685" r:id="rId25"/>
     <p:sldLayoutId id="2147483686" r:id="rId26"/>
     <p:sldLayoutId id="2147483687" r:id="rId27"/>
+    <p:sldLayoutId id="2147483688" r:id="rId28"/>
   </p:sldLayoutIdLst>
   <p:transition>
     <p:fade/>
@@ -32450,18 +32542,13 @@
             <p:ph type="title"/>
           </p:nvPr>
         </p:nvSpPr>
-        <p:spPr>
-          <a:xfrm>
-            <a:off x="269239" y="2084186"/>
-            <a:ext cx="9859116" cy="2139688"/>
-          </a:xfrm>
-        </p:spPr>
+        <p:spPr/>
         <p:txBody>
           <a:bodyPr/>
           <a:lstStyle/>
           <a:p>
             <a:r>
-              <a:rPr lang="en-US"/>
+              <a:rPr lang="en-US" dirty="0"/>
               <a:t>Hands on Lab:  Logic Apps</a:t>
             </a:r>
           </a:p>
@@ -32480,22 +32567,93 @@
             <a:spLocks noGrp="1"/>
           </p:cNvSpPr>
           <p:nvPr>
-            <p:ph type="body" sz="quarter" idx="12"/>
+            <p:ph type="body" sz="quarter" idx="4294967295"/>
           </p:nvPr>
         </p:nvSpPr>
-        <p:spPr/>
+        <p:spPr>
+          <a:xfrm>
+            <a:off x="0" y="428754"/>
+            <a:ext cx="7731967" cy="4046236"/>
+          </a:xfrm>
+        </p:spPr>
         <p:txBody>
           <a:bodyPr/>
           <a:lstStyle/>
           <a:p>
-            <a:endParaRPr lang="en-US"/>
+            <a:endParaRPr lang="en-US" dirty="0"/>
+          </a:p>
+          <a:p>
+            <a:endParaRPr lang="en-US" dirty="0"/>
+          </a:p>
+          <a:p>
+            <a:r>
+              <a:rPr lang="en-US" b="1" dirty="0">
+                <a:solidFill>
+                  <a:schemeClr val="accent2"/>
+                </a:solidFill>
+              </a:rPr>
+              <a:t>https://aka.ms/LA_CheatSheet</a:t>
+            </a:r>
+          </a:p>
+          <a:p>
+            <a:endParaRPr lang="en-US" b="1" dirty="0">
+              <a:solidFill>
+                <a:schemeClr val="accent2"/>
+              </a:solidFill>
+            </a:endParaRPr>
+          </a:p>
+          <a:p>
+            <a:endParaRPr lang="en-US" b="1" dirty="0">
+              <a:solidFill>
+                <a:schemeClr val="accent2"/>
+              </a:solidFill>
+            </a:endParaRPr>
+          </a:p>
+          <a:p>
+            <a:endParaRPr lang="en-US" dirty="0"/>
           </a:p>
         </p:txBody>
       </p:sp>
+      <p:pic>
+        <p:nvPicPr>
+          <p:cNvPr id="3" name="Picture 2">
+            <a:extLst>
+              <a:ext uri="{FF2B5EF4-FFF2-40B4-BE49-F238E27FC236}">
+                <a16:creationId xmlns:a16="http://schemas.microsoft.com/office/drawing/2014/main" id="{EDC249CA-BD13-49BB-9923-91E140EEE02D}"/>
+              </a:ext>
+            </a:extLst>
+          </p:cNvPr>
+          <p:cNvPicPr>
+            <a:picLocks noChangeAspect="1"/>
+          </p:cNvPicPr>
+          <p:nvPr/>
+        </p:nvPicPr>
+        <p:blipFill>
+          <a:blip r:embed="rId3">
+            <a:extLst>
+              <a:ext uri="{28A0092B-C50C-407E-A947-70E740481C1C}">
+                <a14:useLocalDpi xmlns:a14="http://schemas.microsoft.com/office/drawing/2010/main" val="0"/>
+              </a:ext>
+            </a:extLst>
+          </a:blip>
+          <a:stretch>
+            <a:fillRect/>
+          </a:stretch>
+        </p:blipFill>
+        <p:spPr>
+          <a:xfrm>
+            <a:off x="6923314" y="1828799"/>
+            <a:ext cx="4964164" cy="4879910"/>
+          </a:xfrm>
+          <a:prstGeom prst="rect">
+            <a:avLst/>
+          </a:prstGeom>
+        </p:spPr>
+      </p:pic>
     </p:spTree>
     <p:extLst>
       <p:ext uri="{BB962C8B-B14F-4D97-AF65-F5344CB8AC3E}">
-        <p14:creationId xmlns:p14="http://schemas.microsoft.com/office/powerpoint/2010/main" val="3882891961"/>
+        <p14:creationId xmlns:p14="http://schemas.microsoft.com/office/powerpoint/2010/main" val="1490785613"/>
       </p:ext>
     </p:extLst>
   </p:cSld>
@@ -45017,46 +45175,58 @@
             <p:ph type="title"/>
           </p:nvPr>
         </p:nvSpPr>
-        <p:spPr>
-          <a:xfrm>
-            <a:off x="269239" y="2084186"/>
-            <a:ext cx="9859116" cy="1162178"/>
-          </a:xfrm>
-        </p:spPr>
-        <p:txBody>
-          <a:bodyPr/>
-          <a:lstStyle/>
-          <a:p>
-            <a:r>
-              <a:rPr lang="en-US"/>
-              <a:t>Logic Apps Demo</a:t>
-            </a:r>
-          </a:p>
-        </p:txBody>
-      </p:sp>
-      <p:sp>
-        <p:nvSpPr>
-          <p:cNvPr id="5" name="Text Placeholder 4"/>
-          <p:cNvSpPr>
-            <a:spLocks noGrp="1"/>
-          </p:cNvSpPr>
-          <p:nvPr>
-            <p:ph type="body" sz="quarter" idx="12"/>
-          </p:nvPr>
-        </p:nvSpPr>
         <p:spPr/>
         <p:txBody>
           <a:bodyPr/>
           <a:lstStyle/>
           <a:p>
-            <a:endParaRPr lang="en-US"/>
+            <a:r>
+              <a:rPr lang="en-US" dirty="0"/>
+              <a:t>Logic Apps Demo</a:t>
+            </a:r>
           </a:p>
         </p:txBody>
       </p:sp>
+      <p:pic>
+        <p:nvPicPr>
+          <p:cNvPr id="4" name="Picture 3">
+            <a:extLst>
+              <a:ext uri="{FF2B5EF4-FFF2-40B4-BE49-F238E27FC236}">
+                <a16:creationId xmlns:a16="http://schemas.microsoft.com/office/drawing/2014/main" id="{361CB652-4CFB-4784-8C5F-754C3C5A6733}"/>
+              </a:ext>
+            </a:extLst>
+          </p:cNvPr>
+          <p:cNvPicPr>
+            <a:picLocks noChangeAspect="1"/>
+          </p:cNvPicPr>
+          <p:nvPr/>
+        </p:nvPicPr>
+        <p:blipFill>
+          <a:blip r:embed="rId3">
+            <a:extLst>
+              <a:ext uri="{28A0092B-C50C-407E-A947-70E740481C1C}">
+                <a14:useLocalDpi xmlns:a14="http://schemas.microsoft.com/office/drawing/2010/main" val="0"/>
+              </a:ext>
+            </a:extLst>
+          </a:blip>
+          <a:stretch>
+            <a:fillRect/>
+          </a:stretch>
+        </p:blipFill>
+        <p:spPr>
+          <a:xfrm>
+            <a:off x="2170650" y="1545364"/>
+            <a:ext cx="8024871" cy="4762535"/>
+          </a:xfrm>
+          <a:prstGeom prst="rect">
+            <a:avLst/>
+          </a:prstGeom>
+        </p:spPr>
+      </p:pic>
     </p:spTree>
     <p:extLst>
       <p:ext uri="{BB962C8B-B14F-4D97-AF65-F5344CB8AC3E}">
-        <p14:creationId xmlns:p14="http://schemas.microsoft.com/office/powerpoint/2010/main" val="3284719314"/>
+        <p14:creationId xmlns:p14="http://schemas.microsoft.com/office/powerpoint/2010/main" val="1935137633"/>
       </p:ext>
     </p:extLst>
   </p:cSld>

</xml_diff>

<commit_message>
Updated Logic App slide order
</commit_message>
<xml_diff>
--- a/5-Logic_App_Overview/Serverless_Workshop-Logic_Apps_Overview.pptx
+++ b/5-Logic_App_Overview/Serverless_Workshop-Logic_Apps_Overview.pptx
@@ -28,9 +28,9 @@
     <p:sldId id="272" r:id="rId19"/>
     <p:sldId id="273" r:id="rId20"/>
     <p:sldId id="274" r:id="rId21"/>
-    <p:sldId id="279" r:id="rId22"/>
-    <p:sldId id="276" r:id="rId23"/>
-    <p:sldId id="277" r:id="rId24"/>
+    <p:sldId id="276" r:id="rId22"/>
+    <p:sldId id="277" r:id="rId23"/>
+    <p:sldId id="279" r:id="rId24"/>
   </p:sldIdLst>
   <p:sldSz cx="12192000" cy="6858000"/>
   <p:notesSz cx="6858000" cy="9144000"/>
@@ -153,9 +153,9 @@
             <p14:sldId id="272"/>
             <p14:sldId id="273"/>
             <p14:sldId id="274"/>
-            <p14:sldId id="279"/>
             <p14:sldId id="276"/>
             <p14:sldId id="277"/>
+            <p14:sldId id="279"/>
           </p14:sldIdLst>
         </p14:section>
         <p14:section name="Default Section" id="{D69285F5-183D-44B6-B260-8DD20624D21B}">
@@ -3019,7 +3019,7 @@
           <a:p>
             <a:fld id="{FD40F9F5-AEEA-4D4C-B19D-E89DDEC55240}" type="datetimeFigureOut">
               <a:rPr lang="en-US" smtClean="0"/>
-              <a:t>2/9/2018</a:t>
+              <a:t>3/14/2018</a:t>
             </a:fld>
             <a:endParaRPr lang="en-US"/>
           </a:p>
@@ -3593,7 +3593,7 @@
                 <a:tabLst/>
                 <a:defRPr/>
               </a:pPr>
-              <a:t>2/9/2018 2:34 PM</a:t>
+              <a:t>3/14/2018 9:14 AM</a:t>
             </a:fld>
             <a:endParaRPr kumimoji="0" lang="en-US" sz="1800" b="0" i="0" u="none" strike="noStrike" kern="0" cap="none" spc="0" normalizeH="0" baseline="0" noProof="0">
               <a:ln>
@@ -3987,7 +3987,7 @@
                 <a:tabLst/>
                 <a:defRPr/>
               </a:pPr>
-              <a:t>2/9/2018 2:34 PM</a:t>
+              <a:t>3/14/2018 9:14 AM</a:t>
             </a:fld>
             <a:endParaRPr kumimoji="0" lang="en-US" sz="1800" b="0" i="0" u="none" strike="noStrike" kern="0" cap="none" spc="0" normalizeH="0" baseline="0" noProof="0">
               <a:ln>
@@ -4323,7 +4323,7 @@
                 <a:tabLst/>
                 <a:defRPr/>
               </a:pPr>
-              <a:t>2/9/2018 2:34 PM</a:t>
+              <a:t>3/14/2018 9:14 AM</a:t>
             </a:fld>
             <a:endParaRPr kumimoji="0" lang="en-US" sz="1200" b="0" i="0" u="none" strike="noStrike" kern="1200" cap="none" spc="0" normalizeH="0" baseline="0" noProof="0">
               <a:ln>
@@ -4769,7 +4769,7 @@
                 <a:tabLst/>
                 <a:defRPr/>
               </a:pPr>
-              <a:t>2/9/2018 2:34 PM</a:t>
+              <a:t>3/14/2018 9:14 AM</a:t>
             </a:fld>
             <a:endParaRPr kumimoji="0" lang="en-US" sz="1800" b="0" i="0" u="none" strike="noStrike" kern="0" cap="none" spc="0" normalizeH="0" baseline="0" noProof="0">
               <a:ln>
@@ -5146,7 +5146,7 @@
                 <a:tabLst/>
                 <a:defRPr/>
               </a:pPr>
-              <a:t>2/9/2018 2:34 PM</a:t>
+              <a:t>3/14/2018 9:14 AM</a:t>
             </a:fld>
             <a:endParaRPr kumimoji="0" lang="en-US" sz="1200" b="0" i="0" u="none" strike="noStrike" kern="1200" cap="none" spc="0" normalizeH="0" baseline="0" noProof="0">
               <a:ln>
@@ -5482,7 +5482,7 @@
                 <a:tabLst/>
                 <a:defRPr/>
               </a:pPr>
-              <a:t>2/9/2018 2:34 PM</a:t>
+              <a:t>3/14/2018 9:14 AM</a:t>
             </a:fld>
             <a:endParaRPr kumimoji="0" lang="en-US" sz="1200" b="0" i="0" u="none" strike="noStrike" kern="1200" cap="none" spc="0" normalizeH="0" baseline="0" noProof="0">
               <a:ln>
@@ -5799,7 +5799,7 @@
                 <a:tabLst/>
                 <a:defRPr/>
               </a:pPr>
-              <a:t>2/9/2018 2:34 PM</a:t>
+              <a:t>3/14/2018 9:14 AM</a:t>
             </a:fld>
             <a:endParaRPr kumimoji="0" lang="en-US" sz="1200" b="0" i="0" u="none" strike="noStrike" kern="1200" cap="none" spc="0" normalizeH="0" baseline="0" noProof="0">
               <a:ln>
@@ -6135,7 +6135,7 @@
                 <a:tabLst/>
                 <a:defRPr/>
               </a:pPr>
-              <a:t>2/9/2018 2:34 PM</a:t>
+              <a:t>3/14/2018 9:14 AM</a:t>
             </a:fld>
             <a:endParaRPr kumimoji="0" lang="en-US" sz="1200" b="0" i="0" u="none" strike="noStrike" kern="1200" cap="none" spc="0" normalizeH="0" baseline="0" noProof="0">
               <a:ln>
@@ -6471,7 +6471,7 @@
                 <a:tabLst/>
                 <a:defRPr/>
               </a:pPr>
-              <a:t>2/9/2018 2:34 PM</a:t>
+              <a:t>3/14/2018 9:14 AM</a:t>
             </a:fld>
             <a:endParaRPr kumimoji="0" lang="en-US" sz="1200" b="0" i="0" u="none" strike="noStrike" kern="1200" cap="none" spc="0" normalizeH="0" baseline="0" noProof="0">
               <a:ln>
@@ -6807,7 +6807,7 @@
                 <a:tabLst/>
                 <a:defRPr/>
               </a:pPr>
-              <a:t>2/9/2018 2:34 PM</a:t>
+              <a:t>3/14/2018 9:14 AM</a:t>
             </a:fld>
             <a:endParaRPr kumimoji="0" lang="en-US" sz="1200" b="0" i="0" u="none" strike="noStrike" kern="1200" cap="none" spc="0" normalizeH="0" baseline="0" noProof="0">
               <a:ln>
@@ -7344,7 +7344,7 @@
     </p:spTree>
     <p:extLst>
       <p:ext uri="{BB962C8B-B14F-4D97-AF65-F5344CB8AC3E}">
-        <p14:creationId xmlns:p14="http://schemas.microsoft.com/office/powerpoint/2010/main" val="3351280317"/>
+        <p14:creationId xmlns:p14="http://schemas.microsoft.com/office/powerpoint/2010/main" val="117806162"/>
       </p:ext>
     </p:extLst>
   </p:cSld>
@@ -7488,7 +7488,7 @@
     </p:spTree>
     <p:extLst>
       <p:ext uri="{BB962C8B-B14F-4D97-AF65-F5344CB8AC3E}">
-        <p14:creationId xmlns:p14="http://schemas.microsoft.com/office/powerpoint/2010/main" val="117806162"/>
+        <p14:creationId xmlns:p14="http://schemas.microsoft.com/office/powerpoint/2010/main" val="1343912425"/>
       </p:ext>
     </p:extLst>
   </p:cSld>
@@ -7632,7 +7632,7 @@
     </p:spTree>
     <p:extLst>
       <p:ext uri="{BB962C8B-B14F-4D97-AF65-F5344CB8AC3E}">
-        <p14:creationId xmlns:p14="http://schemas.microsoft.com/office/powerpoint/2010/main" val="1343912425"/>
+        <p14:creationId xmlns:p14="http://schemas.microsoft.com/office/powerpoint/2010/main" val="3351280317"/>
       </p:ext>
     </p:extLst>
   </p:cSld>
@@ -7863,7 +7863,7 @@
                 <a:tabLst/>
                 <a:defRPr/>
               </a:pPr>
-              <a:t>2/9/2018 2:34 PM</a:t>
+              <a:t>3/14/2018 9:14 AM</a:t>
             </a:fld>
             <a:endParaRPr kumimoji="0" lang="en-US" sz="1200" b="0" i="0" u="none" strike="noStrike" kern="1200" cap="none" spc="0" normalizeH="0" baseline="0" noProof="0">
               <a:ln>
@@ -8202,7 +8202,7 @@
                 <a:tabLst/>
                 <a:defRPr/>
               </a:pPr>
-              <a:t>2/9/2018 2:34 PM</a:t>
+              <a:t>3/14/2018 9:14 AM</a:t>
             </a:fld>
             <a:endParaRPr kumimoji="0" lang="en-US" sz="1800" b="0" i="0" u="none" strike="noStrike" kern="0" cap="none" spc="0" normalizeH="0" baseline="0" noProof="0">
               <a:ln>
@@ -8541,7 +8541,7 @@
                 <a:tabLst/>
                 <a:defRPr/>
               </a:pPr>
-              <a:t>2/9/2018 2:34 PM</a:t>
+              <a:t>3/14/2018 9:14 AM</a:t>
             </a:fld>
             <a:endParaRPr kumimoji="0" lang="en-US" sz="1800" b="0" i="0" u="none" strike="noStrike" kern="0" cap="none" spc="0" normalizeH="0" baseline="0" noProof="0">
               <a:ln>
@@ -8880,7 +8880,7 @@
                 <a:tabLst/>
                 <a:defRPr/>
               </a:pPr>
-              <a:t>2/9/2018 2:34 PM</a:t>
+              <a:t>3/14/2018 9:14 AM</a:t>
             </a:fld>
             <a:endParaRPr kumimoji="0" lang="en-US" sz="1800" b="0" i="0" u="none" strike="noStrike" kern="0" cap="none" spc="0" normalizeH="0" baseline="0" noProof="0">
               <a:ln>
@@ -9219,7 +9219,7 @@
                 <a:tabLst/>
                 <a:defRPr/>
               </a:pPr>
-              <a:t>2/9/2018 2:34 PM</a:t>
+              <a:t>3/14/2018 9:14 AM</a:t>
             </a:fld>
             <a:endParaRPr kumimoji="0" lang="en-US" sz="1800" b="0" i="0" u="none" strike="noStrike" kern="0" cap="none" spc="0" normalizeH="0" baseline="0" noProof="0">
               <a:ln>
@@ -9705,7 +9705,7 @@
                 <a:tabLst/>
                 <a:defRPr/>
               </a:pPr>
-              <a:t>2/9/2018 2:34 PM</a:t>
+              <a:t>3/14/2018 9:14 AM</a:t>
             </a:fld>
             <a:endParaRPr kumimoji="0" lang="en-US" sz="1800" b="0" i="0" u="none" strike="noStrike" kern="0" cap="none" spc="0" normalizeH="0" baseline="0" noProof="0">
               <a:ln>
@@ -9967,7 +9967,7 @@
           <a:p>
             <a:fld id="{28BB1C66-085B-436B-BA13-97E320E7DC4F}" type="datetimeFigureOut">
               <a:rPr lang="en-US" smtClean="0"/>
-              <a:t>2/9/2018</a:t>
+              <a:t>3/14/2018</a:t>
             </a:fld>
             <a:endParaRPr lang="en-US"/>
           </a:p>
@@ -10165,7 +10165,7 @@
           <a:p>
             <a:fld id="{28BB1C66-085B-436B-BA13-97E320E7DC4F}" type="datetimeFigureOut">
               <a:rPr lang="en-US" smtClean="0"/>
-              <a:t>2/9/2018</a:t>
+              <a:t>3/14/2018</a:t>
             </a:fld>
             <a:endParaRPr lang="en-US"/>
           </a:p>
@@ -10373,7 +10373,7 @@
           <a:p>
             <a:fld id="{28BB1C66-085B-436B-BA13-97E320E7DC4F}" type="datetimeFigureOut">
               <a:rPr lang="en-US" smtClean="0"/>
-              <a:t>2/9/2018</a:t>
+              <a:t>3/14/2018</a:t>
             </a:fld>
             <a:endParaRPr lang="en-US"/>
           </a:p>
@@ -11971,7 +11971,7 @@
           <a:p>
             <a:fld id="{28BB1C66-085B-436B-BA13-97E320E7DC4F}" type="datetimeFigureOut">
               <a:rPr lang="en-US" smtClean="0"/>
-              <a:t>2/9/2018</a:t>
+              <a:t>3/14/2018</a:t>
             </a:fld>
             <a:endParaRPr lang="en-US"/>
           </a:p>
@@ -13662,7 +13662,7 @@
           <a:p>
             <a:fld id="{28BB1C66-085B-436B-BA13-97E320E7DC4F}" type="datetimeFigureOut">
               <a:rPr lang="en-US" smtClean="0"/>
-              <a:t>2/9/2018</a:t>
+              <a:t>3/14/2018</a:t>
             </a:fld>
             <a:endParaRPr lang="en-US"/>
           </a:p>
@@ -14613,7 +14613,7 @@
           <a:p>
             <a:fld id="{72D4B4F5-9F56-4AF2-B8FC-381E478EDD58}" type="datetimeFigureOut">
               <a:rPr lang="en-US" smtClean="0"/>
-              <a:t>2/9/2018</a:t>
+              <a:t>3/14/2018</a:t>
             </a:fld>
             <a:endParaRPr lang="en-US"/>
           </a:p>
@@ -15518,7 +15518,7 @@
           <a:p>
             <a:fld id="{28BB1C66-085B-436B-BA13-97E320E7DC4F}" type="datetimeFigureOut">
               <a:rPr lang="en-US" smtClean="0"/>
-              <a:t>2/9/2018</a:t>
+              <a:t>3/14/2018</a:t>
             </a:fld>
             <a:endParaRPr lang="en-US"/>
           </a:p>
@@ -15930,7 +15930,7 @@
           <a:p>
             <a:fld id="{28BB1C66-085B-436B-BA13-97E320E7DC4F}" type="datetimeFigureOut">
               <a:rPr lang="en-US" smtClean="0"/>
-              <a:t>2/9/2018</a:t>
+              <a:t>3/14/2018</a:t>
             </a:fld>
             <a:endParaRPr lang="en-US"/>
           </a:p>
@@ -16071,7 +16071,7 @@
           <a:p>
             <a:fld id="{28BB1C66-085B-436B-BA13-97E320E7DC4F}" type="datetimeFigureOut">
               <a:rPr lang="en-US" smtClean="0"/>
-              <a:t>2/9/2018</a:t>
+              <a:t>3/14/2018</a:t>
             </a:fld>
             <a:endParaRPr lang="en-US"/>
           </a:p>
@@ -16184,7 +16184,7 @@
           <a:p>
             <a:fld id="{28BB1C66-085B-436B-BA13-97E320E7DC4F}" type="datetimeFigureOut">
               <a:rPr lang="en-US" smtClean="0"/>
-              <a:t>2/9/2018</a:t>
+              <a:t>3/14/2018</a:t>
             </a:fld>
             <a:endParaRPr lang="en-US"/>
           </a:p>
@@ -16495,7 +16495,7 @@
           <a:p>
             <a:fld id="{28BB1C66-085B-436B-BA13-97E320E7DC4F}" type="datetimeFigureOut">
               <a:rPr lang="en-US" smtClean="0"/>
-              <a:t>2/9/2018</a:t>
+              <a:t>3/14/2018</a:t>
             </a:fld>
             <a:endParaRPr lang="en-US"/>
           </a:p>
@@ -16783,7 +16783,7 @@
           <a:p>
             <a:fld id="{28BB1C66-085B-436B-BA13-97E320E7DC4F}" type="datetimeFigureOut">
               <a:rPr lang="en-US" smtClean="0"/>
-              <a:t>2/9/2018</a:t>
+              <a:t>3/14/2018</a:t>
             </a:fld>
             <a:endParaRPr lang="en-US"/>
           </a:p>
@@ -17024,7 +17024,7 @@
           <a:p>
             <a:fld id="{28BB1C66-085B-436B-BA13-97E320E7DC4F}" type="datetimeFigureOut">
               <a:rPr lang="en-US" smtClean="0"/>
-              <a:t>2/9/2018</a:t>
+              <a:t>3/14/2018</a:t>
             </a:fld>
             <a:endParaRPr lang="en-US"/>
           </a:p>
@@ -32528,6 +32528,266 @@
       </p:grpSpPr>
       <p:sp>
         <p:nvSpPr>
+          <p:cNvPr id="3" name="Text Placeholder 2">
+            <a:extLst>
+              <a:ext uri="{FF2B5EF4-FFF2-40B4-BE49-F238E27FC236}">
+                <a16:creationId xmlns:a16="http://schemas.microsoft.com/office/drawing/2014/main" id="{F284BFF8-52C0-4A76-99F7-5DD1DC4EBC31}"/>
+              </a:ext>
+            </a:extLst>
+          </p:cNvPr>
+          <p:cNvSpPr>
+            <a:spLocks noGrp="1"/>
+          </p:cNvSpPr>
+          <p:nvPr>
+            <p:ph type="body" sz="quarter" idx="10"/>
+          </p:nvPr>
+        </p:nvSpPr>
+        <p:spPr>
+          <a:xfrm>
+            <a:off x="269303" y="1187645"/>
+            <a:ext cx="11655078" cy="3925562"/>
+          </a:xfrm>
+        </p:spPr>
+        <p:txBody>
+          <a:bodyPr/>
+          <a:lstStyle/>
+          <a:p>
+            <a:r>
+              <a:rPr lang="en-US" dirty="0"/>
+              <a:t>Know the Limits of Logic Apps</a:t>
+            </a:r>
+          </a:p>
+          <a:p>
+            <a:r>
+              <a:rPr lang="en-US" dirty="0"/>
+              <a:t>Consider the workflow – high throughput vs long </a:t>
+            </a:r>
+            <a:r>
+              <a:rPr lang="en-US"/>
+              <a:t>running workflow</a:t>
+            </a:r>
+            <a:endParaRPr lang="en-US" dirty="0"/>
+          </a:p>
+          <a:p>
+            <a:r>
+              <a:rPr lang="en-US" dirty="0"/>
+              <a:t>Understand the data structure</a:t>
+            </a:r>
+          </a:p>
+          <a:p>
+            <a:r>
+              <a:rPr lang="en-US" dirty="0"/>
+              <a:t>Leverage concurrency as much as possible</a:t>
+            </a:r>
+          </a:p>
+          <a:p>
+            <a:r>
+              <a:rPr lang="en-US" dirty="0"/>
+              <a:t>Consider side-by-side strategy for testing</a:t>
+            </a:r>
+          </a:p>
+        </p:txBody>
+      </p:sp>
+      <p:sp>
+        <p:nvSpPr>
+          <p:cNvPr id="2" name="Title 1">
+            <a:extLst>
+              <a:ext uri="{FF2B5EF4-FFF2-40B4-BE49-F238E27FC236}">
+                <a16:creationId xmlns:a16="http://schemas.microsoft.com/office/drawing/2014/main" id="{495413AB-737B-4EBA-9C16-9AA33DDD0013}"/>
+              </a:ext>
+            </a:extLst>
+          </p:cNvPr>
+          <p:cNvSpPr>
+            <a:spLocks noGrp="1"/>
+          </p:cNvSpPr>
+          <p:nvPr>
+            <p:ph type="title"/>
+          </p:nvPr>
+        </p:nvSpPr>
+        <p:spPr/>
+        <p:txBody>
+          <a:bodyPr/>
+          <a:lstStyle/>
+          <a:p>
+            <a:r>
+              <a:rPr lang="en-US"/>
+              <a:t>Learnings</a:t>
+            </a:r>
+          </a:p>
+        </p:txBody>
+      </p:sp>
+    </p:spTree>
+    <p:extLst>
+      <p:ext uri="{BB962C8B-B14F-4D97-AF65-F5344CB8AC3E}">
+        <p14:creationId xmlns:p14="http://schemas.microsoft.com/office/powerpoint/2010/main" val="570094479"/>
+      </p:ext>
+    </p:extLst>
+  </p:cSld>
+  <p:clrMapOvr>
+    <a:masterClrMapping/>
+  </p:clrMapOvr>
+  <p:transition>
+    <p:fade/>
+  </p:transition>
+</p:sld>
+</file>
+
+<file path=ppt/slides/slide21.xml><?xml version="1.0" encoding="utf-8"?>
+<p:sld xmlns:a="http://schemas.openxmlformats.org/drawingml/2006/main" xmlns:r="http://schemas.openxmlformats.org/officeDocument/2006/relationships" xmlns:p="http://schemas.openxmlformats.org/presentationml/2006/main">
+  <p:cSld>
+    <p:spTree>
+      <p:nvGrpSpPr>
+        <p:cNvPr id="1" name=""/>
+        <p:cNvGrpSpPr/>
+        <p:nvPr/>
+      </p:nvGrpSpPr>
+      <p:grpSpPr>
+        <a:xfrm>
+          <a:off x="0" y="0"/>
+          <a:ext cx="0" cy="0"/>
+          <a:chOff x="0" y="0"/>
+          <a:chExt cx="0" cy="0"/>
+        </a:xfrm>
+      </p:grpSpPr>
+      <p:sp>
+        <p:nvSpPr>
+          <p:cNvPr id="3" name="Text Placeholder 2">
+            <a:extLst>
+              <a:ext uri="{FF2B5EF4-FFF2-40B4-BE49-F238E27FC236}">
+                <a16:creationId xmlns:a16="http://schemas.microsoft.com/office/drawing/2014/main" id="{F284BFF8-52C0-4A76-99F7-5DD1DC4EBC31}"/>
+              </a:ext>
+            </a:extLst>
+          </p:cNvPr>
+          <p:cNvSpPr>
+            <a:spLocks noGrp="1"/>
+          </p:cNvSpPr>
+          <p:nvPr>
+            <p:ph type="body" sz="quarter" idx="10"/>
+          </p:nvPr>
+        </p:nvSpPr>
+        <p:spPr>
+          <a:xfrm>
+            <a:off x="269303" y="1187645"/>
+            <a:ext cx="11655078" cy="4589270"/>
+          </a:xfrm>
+        </p:spPr>
+        <p:txBody>
+          <a:bodyPr/>
+          <a:lstStyle/>
+          <a:p>
+            <a:r>
+              <a:rPr lang="en-US" dirty="0"/>
+              <a:t>Not a lightweight BizTalk</a:t>
+            </a:r>
+          </a:p>
+          <a:p>
+            <a:r>
+              <a:rPr lang="en-US" dirty="0"/>
+              <a:t>Its not a silver bullet</a:t>
+            </a:r>
+          </a:p>
+          <a:p>
+            <a:r>
+              <a:rPr lang="en-US" dirty="0"/>
+              <a:t>Be aware of the workload (for loops, </a:t>
+            </a:r>
+            <a:r>
+              <a:rPr lang="en-US" dirty="0" err="1"/>
+              <a:t>etc</a:t>
+            </a:r>
+            <a:r>
+              <a:rPr lang="en-US" dirty="0"/>
+              <a:t>)</a:t>
+            </a:r>
+          </a:p>
+          <a:p>
+            <a:r>
+              <a:rPr lang="en-US" dirty="0"/>
+              <a:t>Management is either in the portal or Visual Studio</a:t>
+            </a:r>
+          </a:p>
+          <a:p>
+            <a:r>
+              <a:rPr lang="en-US" dirty="0"/>
+              <a:t>ALM is defined in VSTS, but has short comings</a:t>
+            </a:r>
+          </a:p>
+          <a:p>
+            <a:r>
+              <a:rPr lang="en-US" dirty="0"/>
+              <a:t>There is not much guidance – but that’s why we are here!</a:t>
+            </a:r>
+          </a:p>
+        </p:txBody>
+      </p:sp>
+      <p:sp>
+        <p:nvSpPr>
+          <p:cNvPr id="2" name="Title 1">
+            <a:extLst>
+              <a:ext uri="{FF2B5EF4-FFF2-40B4-BE49-F238E27FC236}">
+                <a16:creationId xmlns:a16="http://schemas.microsoft.com/office/drawing/2014/main" id="{495413AB-737B-4EBA-9C16-9AA33DDD0013}"/>
+              </a:ext>
+            </a:extLst>
+          </p:cNvPr>
+          <p:cNvSpPr>
+            <a:spLocks noGrp="1"/>
+          </p:cNvSpPr>
+          <p:nvPr>
+            <p:ph type="title"/>
+          </p:nvPr>
+        </p:nvSpPr>
+        <p:spPr/>
+        <p:txBody>
+          <a:bodyPr/>
+          <a:lstStyle/>
+          <a:p>
+            <a:r>
+              <a:rPr lang="en-US"/>
+              <a:t>Misconceptions and </a:t>
+            </a:r>
+            <a:r>
+              <a:rPr lang="en-US" err="1"/>
+              <a:t>Gotchas</a:t>
+            </a:r>
+            <a:endParaRPr lang="en-US"/>
+          </a:p>
+        </p:txBody>
+      </p:sp>
+    </p:spTree>
+    <p:extLst>
+      <p:ext uri="{BB962C8B-B14F-4D97-AF65-F5344CB8AC3E}">
+        <p14:creationId xmlns:p14="http://schemas.microsoft.com/office/powerpoint/2010/main" val="3149880495"/>
+      </p:ext>
+    </p:extLst>
+  </p:cSld>
+  <p:clrMapOvr>
+    <a:masterClrMapping/>
+  </p:clrMapOvr>
+  <p:transition>
+    <p:fade/>
+  </p:transition>
+</p:sld>
+</file>
+
+<file path=ppt/slides/slide22.xml><?xml version="1.0" encoding="utf-8"?>
+<p:sld xmlns:a="http://schemas.openxmlformats.org/drawingml/2006/main" xmlns:r="http://schemas.openxmlformats.org/officeDocument/2006/relationships" xmlns:p="http://schemas.openxmlformats.org/presentationml/2006/main">
+  <p:cSld>
+    <p:spTree>
+      <p:nvGrpSpPr>
+        <p:cNvPr id="1" name=""/>
+        <p:cNvGrpSpPr/>
+        <p:nvPr/>
+      </p:nvGrpSpPr>
+      <p:grpSpPr>
+        <a:xfrm>
+          <a:off x="0" y="0"/>
+          <a:ext cx="0" cy="0"/>
+          <a:chOff x="0" y="0"/>
+          <a:chExt cx="0" cy="0"/>
+        </a:xfrm>
+      </p:grpSpPr>
+      <p:sp>
+        <p:nvSpPr>
           <p:cNvPr id="4" name="Title 3">
             <a:extLst>
               <a:ext uri="{FF2B5EF4-FFF2-40B4-BE49-F238E27FC236}">
@@ -32672,266 +32932,6 @@
       </p:transition>
     </mc:Fallback>
   </mc:AlternateContent>
-</p:sld>
-</file>
-
-<file path=ppt/slides/slide21.xml><?xml version="1.0" encoding="utf-8"?>
-<p:sld xmlns:a="http://schemas.openxmlformats.org/drawingml/2006/main" xmlns:r="http://schemas.openxmlformats.org/officeDocument/2006/relationships" xmlns:p="http://schemas.openxmlformats.org/presentationml/2006/main">
-  <p:cSld>
-    <p:spTree>
-      <p:nvGrpSpPr>
-        <p:cNvPr id="1" name=""/>
-        <p:cNvGrpSpPr/>
-        <p:nvPr/>
-      </p:nvGrpSpPr>
-      <p:grpSpPr>
-        <a:xfrm>
-          <a:off x="0" y="0"/>
-          <a:ext cx="0" cy="0"/>
-          <a:chOff x="0" y="0"/>
-          <a:chExt cx="0" cy="0"/>
-        </a:xfrm>
-      </p:grpSpPr>
-      <p:sp>
-        <p:nvSpPr>
-          <p:cNvPr id="3" name="Text Placeholder 2">
-            <a:extLst>
-              <a:ext uri="{FF2B5EF4-FFF2-40B4-BE49-F238E27FC236}">
-                <a16:creationId xmlns:a16="http://schemas.microsoft.com/office/drawing/2014/main" id="{F284BFF8-52C0-4A76-99F7-5DD1DC4EBC31}"/>
-              </a:ext>
-            </a:extLst>
-          </p:cNvPr>
-          <p:cNvSpPr>
-            <a:spLocks noGrp="1"/>
-          </p:cNvSpPr>
-          <p:nvPr>
-            <p:ph type="body" sz="quarter" idx="10"/>
-          </p:nvPr>
-        </p:nvSpPr>
-        <p:spPr>
-          <a:xfrm>
-            <a:off x="269303" y="1187645"/>
-            <a:ext cx="11655078" cy="3925562"/>
-          </a:xfrm>
-        </p:spPr>
-        <p:txBody>
-          <a:bodyPr/>
-          <a:lstStyle/>
-          <a:p>
-            <a:r>
-              <a:rPr lang="en-US" dirty="0"/>
-              <a:t>Know the Limits of Logic Apps</a:t>
-            </a:r>
-          </a:p>
-          <a:p>
-            <a:r>
-              <a:rPr lang="en-US" dirty="0"/>
-              <a:t>Consider the workflow – high throughput vs long </a:t>
-            </a:r>
-            <a:r>
-              <a:rPr lang="en-US"/>
-              <a:t>running workflow</a:t>
-            </a:r>
-            <a:endParaRPr lang="en-US" dirty="0"/>
-          </a:p>
-          <a:p>
-            <a:r>
-              <a:rPr lang="en-US" dirty="0"/>
-              <a:t>Understand the data structure</a:t>
-            </a:r>
-          </a:p>
-          <a:p>
-            <a:r>
-              <a:rPr lang="en-US" dirty="0"/>
-              <a:t>Leverage concurrency as much as possible</a:t>
-            </a:r>
-          </a:p>
-          <a:p>
-            <a:r>
-              <a:rPr lang="en-US" dirty="0"/>
-              <a:t>Consider side-by-side strategy for testing</a:t>
-            </a:r>
-          </a:p>
-        </p:txBody>
-      </p:sp>
-      <p:sp>
-        <p:nvSpPr>
-          <p:cNvPr id="2" name="Title 1">
-            <a:extLst>
-              <a:ext uri="{FF2B5EF4-FFF2-40B4-BE49-F238E27FC236}">
-                <a16:creationId xmlns:a16="http://schemas.microsoft.com/office/drawing/2014/main" id="{495413AB-737B-4EBA-9C16-9AA33DDD0013}"/>
-              </a:ext>
-            </a:extLst>
-          </p:cNvPr>
-          <p:cNvSpPr>
-            <a:spLocks noGrp="1"/>
-          </p:cNvSpPr>
-          <p:nvPr>
-            <p:ph type="title"/>
-          </p:nvPr>
-        </p:nvSpPr>
-        <p:spPr/>
-        <p:txBody>
-          <a:bodyPr/>
-          <a:lstStyle/>
-          <a:p>
-            <a:r>
-              <a:rPr lang="en-US"/>
-              <a:t>Learnings</a:t>
-            </a:r>
-          </a:p>
-        </p:txBody>
-      </p:sp>
-    </p:spTree>
-    <p:extLst>
-      <p:ext uri="{BB962C8B-B14F-4D97-AF65-F5344CB8AC3E}">
-        <p14:creationId xmlns:p14="http://schemas.microsoft.com/office/powerpoint/2010/main" val="570094479"/>
-      </p:ext>
-    </p:extLst>
-  </p:cSld>
-  <p:clrMapOvr>
-    <a:masterClrMapping/>
-  </p:clrMapOvr>
-  <p:transition>
-    <p:fade/>
-  </p:transition>
-</p:sld>
-</file>
-
-<file path=ppt/slides/slide22.xml><?xml version="1.0" encoding="utf-8"?>
-<p:sld xmlns:a="http://schemas.openxmlformats.org/drawingml/2006/main" xmlns:r="http://schemas.openxmlformats.org/officeDocument/2006/relationships" xmlns:p="http://schemas.openxmlformats.org/presentationml/2006/main">
-  <p:cSld>
-    <p:spTree>
-      <p:nvGrpSpPr>
-        <p:cNvPr id="1" name=""/>
-        <p:cNvGrpSpPr/>
-        <p:nvPr/>
-      </p:nvGrpSpPr>
-      <p:grpSpPr>
-        <a:xfrm>
-          <a:off x="0" y="0"/>
-          <a:ext cx="0" cy="0"/>
-          <a:chOff x="0" y="0"/>
-          <a:chExt cx="0" cy="0"/>
-        </a:xfrm>
-      </p:grpSpPr>
-      <p:sp>
-        <p:nvSpPr>
-          <p:cNvPr id="3" name="Text Placeholder 2">
-            <a:extLst>
-              <a:ext uri="{FF2B5EF4-FFF2-40B4-BE49-F238E27FC236}">
-                <a16:creationId xmlns:a16="http://schemas.microsoft.com/office/drawing/2014/main" id="{F284BFF8-52C0-4A76-99F7-5DD1DC4EBC31}"/>
-              </a:ext>
-            </a:extLst>
-          </p:cNvPr>
-          <p:cNvSpPr>
-            <a:spLocks noGrp="1"/>
-          </p:cNvSpPr>
-          <p:nvPr>
-            <p:ph type="body" sz="quarter" idx="10"/>
-          </p:nvPr>
-        </p:nvSpPr>
-        <p:spPr>
-          <a:xfrm>
-            <a:off x="269303" y="1187645"/>
-            <a:ext cx="11655078" cy="4589270"/>
-          </a:xfrm>
-        </p:spPr>
-        <p:txBody>
-          <a:bodyPr/>
-          <a:lstStyle/>
-          <a:p>
-            <a:r>
-              <a:rPr lang="en-US" dirty="0"/>
-              <a:t>Not a lightweight BizTalk</a:t>
-            </a:r>
-          </a:p>
-          <a:p>
-            <a:r>
-              <a:rPr lang="en-US" dirty="0"/>
-              <a:t>Its not a silver bullet</a:t>
-            </a:r>
-          </a:p>
-          <a:p>
-            <a:r>
-              <a:rPr lang="en-US" dirty="0"/>
-              <a:t>Be aware of the workload (for loops, </a:t>
-            </a:r>
-            <a:r>
-              <a:rPr lang="en-US" dirty="0" err="1"/>
-              <a:t>etc</a:t>
-            </a:r>
-            <a:r>
-              <a:rPr lang="en-US" dirty="0"/>
-              <a:t>)</a:t>
-            </a:r>
-          </a:p>
-          <a:p>
-            <a:r>
-              <a:rPr lang="en-US" dirty="0"/>
-              <a:t>Management is either in the portal or Visual Studio</a:t>
-            </a:r>
-          </a:p>
-          <a:p>
-            <a:r>
-              <a:rPr lang="en-US" dirty="0"/>
-              <a:t>ALM is defined in VSTS, but has short comings</a:t>
-            </a:r>
-          </a:p>
-          <a:p>
-            <a:r>
-              <a:rPr lang="en-US" dirty="0"/>
-              <a:t>There is not much guidance – but that’s why we are here!</a:t>
-            </a:r>
-          </a:p>
-        </p:txBody>
-      </p:sp>
-      <p:sp>
-        <p:nvSpPr>
-          <p:cNvPr id="2" name="Title 1">
-            <a:extLst>
-              <a:ext uri="{FF2B5EF4-FFF2-40B4-BE49-F238E27FC236}">
-                <a16:creationId xmlns:a16="http://schemas.microsoft.com/office/drawing/2014/main" id="{495413AB-737B-4EBA-9C16-9AA33DDD0013}"/>
-              </a:ext>
-            </a:extLst>
-          </p:cNvPr>
-          <p:cNvSpPr>
-            <a:spLocks noGrp="1"/>
-          </p:cNvSpPr>
-          <p:nvPr>
-            <p:ph type="title"/>
-          </p:nvPr>
-        </p:nvSpPr>
-        <p:spPr/>
-        <p:txBody>
-          <a:bodyPr/>
-          <a:lstStyle/>
-          <a:p>
-            <a:r>
-              <a:rPr lang="en-US"/>
-              <a:t>Misconceptions and </a:t>
-            </a:r>
-            <a:r>
-              <a:rPr lang="en-US" err="1"/>
-              <a:t>Gotchas</a:t>
-            </a:r>
-            <a:endParaRPr lang="en-US"/>
-          </a:p>
-        </p:txBody>
-      </p:sp>
-    </p:spTree>
-    <p:extLst>
-      <p:ext uri="{BB962C8B-B14F-4D97-AF65-F5344CB8AC3E}">
-        <p14:creationId xmlns:p14="http://schemas.microsoft.com/office/powerpoint/2010/main" val="3149880495"/>
-      </p:ext>
-    </p:extLst>
-  </p:cSld>
-  <p:clrMapOvr>
-    <a:masterClrMapping/>
-  </p:clrMapOvr>
-  <p:transition>
-    <p:fade/>
-  </p:transition>
 </p:sld>
 </file>
 

</xml_diff>